<commit_message>
Insertion of upper axis
</commit_message>
<xml_diff>
--- a/PriliminaryDesign/PriliminaryDesign.pptx
+++ b/PriliminaryDesign/PriliminaryDesign.pptx
@@ -105,6 +105,11 @@
       </a:defRPr>
     </a:lvl9pPr>
   </p:defaultTextStyle>
+  <p:extLst>
+    <p:ext uri="{EFAFB233-063F-42B5-8137-9DF3F51BA10A}">
+      <p15:sldGuideLst xmlns:p15="http://schemas.microsoft.com/office/powerpoint/2012/main"/>
+    </p:ext>
+  </p:extLst>
 </p:presentation>
 </file>
 
@@ -255,7 +260,7 @@
           <a:p>
             <a:fld id="{F0BF1898-6119-4CA0-B6F6-18825E1A88CA}" type="datetimeFigureOut">
               <a:rPr lang="en-US" smtClean="0"/>
-              <a:t>3/3/2023</a:t>
+              <a:t>3/5/2023</a:t>
             </a:fld>
             <a:endParaRPr lang="en-US"/>
           </a:p>
@@ -453,7 +458,7 @@
           <a:p>
             <a:fld id="{F0BF1898-6119-4CA0-B6F6-18825E1A88CA}" type="datetimeFigureOut">
               <a:rPr lang="en-US" smtClean="0"/>
-              <a:t>3/3/2023</a:t>
+              <a:t>3/5/2023</a:t>
             </a:fld>
             <a:endParaRPr lang="en-US"/>
           </a:p>
@@ -661,7 +666,7 @@
           <a:p>
             <a:fld id="{F0BF1898-6119-4CA0-B6F6-18825E1A88CA}" type="datetimeFigureOut">
               <a:rPr lang="en-US" smtClean="0"/>
-              <a:t>3/3/2023</a:t>
+              <a:t>3/5/2023</a:t>
             </a:fld>
             <a:endParaRPr lang="en-US"/>
           </a:p>
@@ -859,7 +864,7 @@
           <a:p>
             <a:fld id="{F0BF1898-6119-4CA0-B6F6-18825E1A88CA}" type="datetimeFigureOut">
               <a:rPr lang="en-US" smtClean="0"/>
-              <a:t>3/3/2023</a:t>
+              <a:t>3/5/2023</a:t>
             </a:fld>
             <a:endParaRPr lang="en-US"/>
           </a:p>
@@ -1134,7 +1139,7 @@
           <a:p>
             <a:fld id="{F0BF1898-6119-4CA0-B6F6-18825E1A88CA}" type="datetimeFigureOut">
               <a:rPr lang="en-US" smtClean="0"/>
-              <a:t>3/3/2023</a:t>
+              <a:t>3/5/2023</a:t>
             </a:fld>
             <a:endParaRPr lang="en-US"/>
           </a:p>
@@ -1399,7 +1404,7 @@
           <a:p>
             <a:fld id="{F0BF1898-6119-4CA0-B6F6-18825E1A88CA}" type="datetimeFigureOut">
               <a:rPr lang="en-US" smtClean="0"/>
-              <a:t>3/3/2023</a:t>
+              <a:t>3/5/2023</a:t>
             </a:fld>
             <a:endParaRPr lang="en-US"/>
           </a:p>
@@ -1811,7 +1816,7 @@
           <a:p>
             <a:fld id="{F0BF1898-6119-4CA0-B6F6-18825E1A88CA}" type="datetimeFigureOut">
               <a:rPr lang="en-US" smtClean="0"/>
-              <a:t>3/3/2023</a:t>
+              <a:t>3/5/2023</a:t>
             </a:fld>
             <a:endParaRPr lang="en-US"/>
           </a:p>
@@ -1952,7 +1957,7 @@
           <a:p>
             <a:fld id="{F0BF1898-6119-4CA0-B6F6-18825E1A88CA}" type="datetimeFigureOut">
               <a:rPr lang="en-US" smtClean="0"/>
-              <a:t>3/3/2023</a:t>
+              <a:t>3/5/2023</a:t>
             </a:fld>
             <a:endParaRPr lang="en-US"/>
           </a:p>
@@ -2065,7 +2070,7 @@
           <a:p>
             <a:fld id="{F0BF1898-6119-4CA0-B6F6-18825E1A88CA}" type="datetimeFigureOut">
               <a:rPr lang="en-US" smtClean="0"/>
-              <a:t>3/3/2023</a:t>
+              <a:t>3/5/2023</a:t>
             </a:fld>
             <a:endParaRPr lang="en-US"/>
           </a:p>
@@ -2376,7 +2381,7 @@
           <a:p>
             <a:fld id="{F0BF1898-6119-4CA0-B6F6-18825E1A88CA}" type="datetimeFigureOut">
               <a:rPr lang="en-US" smtClean="0"/>
-              <a:t>3/3/2023</a:t>
+              <a:t>3/5/2023</a:t>
             </a:fld>
             <a:endParaRPr lang="en-US"/>
           </a:p>
@@ -2664,7 +2669,7 @@
           <a:p>
             <a:fld id="{F0BF1898-6119-4CA0-B6F6-18825E1A88CA}" type="datetimeFigureOut">
               <a:rPr lang="en-US" smtClean="0"/>
-              <a:t>3/3/2023</a:t>
+              <a:t>3/5/2023</a:t>
             </a:fld>
             <a:endParaRPr lang="en-US"/>
           </a:p>
@@ -2905,7 +2910,7 @@
           <a:p>
             <a:fld id="{F0BF1898-6119-4CA0-B6F6-18825E1A88CA}" type="datetimeFigureOut">
               <a:rPr lang="en-US" smtClean="0"/>
-              <a:t>3/3/2023</a:t>
+              <a:t>3/5/2023</a:t>
             </a:fld>
             <a:endParaRPr lang="en-US"/>
           </a:p>
@@ -3567,7 +3572,7 @@
         <p:spPr>
           <a:xfrm>
             <a:off x="133830" y="1833465"/>
-            <a:ext cx="1278293" cy="707886"/>
+            <a:ext cx="1882267" cy="1015663"/>
           </a:xfrm>
           <a:prstGeom prst="rect">
             <a:avLst/>
@@ -3586,6 +3591,20 @@
                 <a:cs typeface="Helvetica" panose="020B0604020202020204" pitchFamily="34" charset="0"/>
               </a:rPr>
               <a:t>Knee motors</a:t>
+            </a:r>
+            <a:r>
+              <a:rPr lang="el-GR" sz="2000" dirty="0">
+                <a:latin typeface="Helvetica" panose="020B0604020202020204" pitchFamily="34" charset="0"/>
+                <a:cs typeface="Helvetica" panose="020B0604020202020204" pitchFamily="34" charset="0"/>
+              </a:rPr>
+              <a:t> Τ-</a:t>
+            </a:r>
+            <a:r>
+              <a:rPr lang="en-US" sz="2000" dirty="0">
+                <a:latin typeface="Helvetica" panose="020B0604020202020204" pitchFamily="34" charset="0"/>
+                <a:cs typeface="Helvetica" panose="020B0604020202020204" pitchFamily="34" charset="0"/>
+              </a:rPr>
+              <a:t>motor U8KV135</a:t>
             </a:r>
           </a:p>
         </p:txBody>
@@ -3792,8 +3811,8 @@
         </p:nvCxnSpPr>
         <p:spPr>
           <a:xfrm flipV="1">
-            <a:off x="1412123" y="2140755"/>
-            <a:ext cx="1048096" cy="46653"/>
+            <a:off x="2016097" y="2140755"/>
+            <a:ext cx="444122" cy="200542"/>
           </a:xfrm>
           <a:prstGeom prst="straightConnector1">
             <a:avLst/>

</xml_diff>

<commit_message>
Alteration of knee design
</commit_message>
<xml_diff>
--- a/PriliminaryDesign/PriliminaryDesign.pptx
+++ b/PriliminaryDesign/PriliminaryDesign.pptx
@@ -7,6 +7,7 @@
   <p:sldIdLst>
     <p:sldId id="256" r:id="rId2"/>
     <p:sldId id="257" r:id="rId3"/>
+    <p:sldId id="258" r:id="rId4"/>
   </p:sldIdLst>
   <p:sldSz cx="12192000" cy="6858000"/>
   <p:notesSz cx="6858000" cy="9144000"/>
@@ -260,7 +261,7 @@
           <a:p>
             <a:fld id="{F0BF1898-6119-4CA0-B6F6-18825E1A88CA}" type="datetimeFigureOut">
               <a:rPr lang="en-US" smtClean="0"/>
-              <a:t>3/5/2023</a:t>
+              <a:t>3/7/2023</a:t>
             </a:fld>
             <a:endParaRPr lang="en-US"/>
           </a:p>
@@ -458,7 +459,7 @@
           <a:p>
             <a:fld id="{F0BF1898-6119-4CA0-B6F6-18825E1A88CA}" type="datetimeFigureOut">
               <a:rPr lang="en-US" smtClean="0"/>
-              <a:t>3/5/2023</a:t>
+              <a:t>3/7/2023</a:t>
             </a:fld>
             <a:endParaRPr lang="en-US"/>
           </a:p>
@@ -666,7 +667,7 @@
           <a:p>
             <a:fld id="{F0BF1898-6119-4CA0-B6F6-18825E1A88CA}" type="datetimeFigureOut">
               <a:rPr lang="en-US" smtClean="0"/>
-              <a:t>3/5/2023</a:t>
+              <a:t>3/7/2023</a:t>
             </a:fld>
             <a:endParaRPr lang="en-US"/>
           </a:p>
@@ -864,7 +865,7 @@
           <a:p>
             <a:fld id="{F0BF1898-6119-4CA0-B6F6-18825E1A88CA}" type="datetimeFigureOut">
               <a:rPr lang="en-US" smtClean="0"/>
-              <a:t>3/5/2023</a:t>
+              <a:t>3/7/2023</a:t>
             </a:fld>
             <a:endParaRPr lang="en-US"/>
           </a:p>
@@ -1139,7 +1140,7 @@
           <a:p>
             <a:fld id="{F0BF1898-6119-4CA0-B6F6-18825E1A88CA}" type="datetimeFigureOut">
               <a:rPr lang="en-US" smtClean="0"/>
-              <a:t>3/5/2023</a:t>
+              <a:t>3/7/2023</a:t>
             </a:fld>
             <a:endParaRPr lang="en-US"/>
           </a:p>
@@ -1404,7 +1405,7 @@
           <a:p>
             <a:fld id="{F0BF1898-6119-4CA0-B6F6-18825E1A88CA}" type="datetimeFigureOut">
               <a:rPr lang="en-US" smtClean="0"/>
-              <a:t>3/5/2023</a:t>
+              <a:t>3/7/2023</a:t>
             </a:fld>
             <a:endParaRPr lang="en-US"/>
           </a:p>
@@ -1816,7 +1817,7 @@
           <a:p>
             <a:fld id="{F0BF1898-6119-4CA0-B6F6-18825E1A88CA}" type="datetimeFigureOut">
               <a:rPr lang="en-US" smtClean="0"/>
-              <a:t>3/5/2023</a:t>
+              <a:t>3/7/2023</a:t>
             </a:fld>
             <a:endParaRPr lang="en-US"/>
           </a:p>
@@ -1957,7 +1958,7 @@
           <a:p>
             <a:fld id="{F0BF1898-6119-4CA0-B6F6-18825E1A88CA}" type="datetimeFigureOut">
               <a:rPr lang="en-US" smtClean="0"/>
-              <a:t>3/5/2023</a:t>
+              <a:t>3/7/2023</a:t>
             </a:fld>
             <a:endParaRPr lang="en-US"/>
           </a:p>
@@ -2070,7 +2071,7 @@
           <a:p>
             <a:fld id="{F0BF1898-6119-4CA0-B6F6-18825E1A88CA}" type="datetimeFigureOut">
               <a:rPr lang="en-US" smtClean="0"/>
-              <a:t>3/5/2023</a:t>
+              <a:t>3/7/2023</a:t>
             </a:fld>
             <a:endParaRPr lang="en-US"/>
           </a:p>
@@ -2381,7 +2382,7 @@
           <a:p>
             <a:fld id="{F0BF1898-6119-4CA0-B6F6-18825E1A88CA}" type="datetimeFigureOut">
               <a:rPr lang="en-US" smtClean="0"/>
-              <a:t>3/5/2023</a:t>
+              <a:t>3/7/2023</a:t>
             </a:fld>
             <a:endParaRPr lang="en-US"/>
           </a:p>
@@ -2669,7 +2670,7 @@
           <a:p>
             <a:fld id="{F0BF1898-6119-4CA0-B6F6-18825E1A88CA}" type="datetimeFigureOut">
               <a:rPr lang="en-US" smtClean="0"/>
-              <a:t>3/5/2023</a:t>
+              <a:t>3/7/2023</a:t>
             </a:fld>
             <a:endParaRPr lang="en-US"/>
           </a:p>
@@ -2910,7 +2911,7 @@
           <a:p>
             <a:fld id="{F0BF1898-6119-4CA0-B6F6-18825E1A88CA}" type="datetimeFigureOut">
               <a:rPr lang="en-US" smtClean="0"/>
-              <a:t>3/5/2023</a:t>
+              <a:t>3/7/2023</a:t>
             </a:fld>
             <a:endParaRPr lang="en-US"/>
           </a:p>
@@ -4976,6 +4977,578 @@
 </p:sld>
 </file>
 
+<file path=ppt/slides/slide3.xml><?xml version="1.0" encoding="utf-8"?>
+<p:sld xmlns:a="http://schemas.openxmlformats.org/drawingml/2006/main" xmlns:r="http://schemas.openxmlformats.org/officeDocument/2006/relationships" xmlns:p="http://schemas.openxmlformats.org/presentationml/2006/main">
+  <p:cSld>
+    <p:spTree>
+      <p:nvGrpSpPr>
+        <p:cNvPr id="1" name=""/>
+        <p:cNvGrpSpPr/>
+        <p:nvPr/>
+      </p:nvGrpSpPr>
+      <p:grpSpPr>
+        <a:xfrm>
+          <a:off x="0" y="0"/>
+          <a:ext cx="0" cy="0"/>
+          <a:chOff x="0" y="0"/>
+          <a:chExt cx="0" cy="0"/>
+        </a:xfrm>
+      </p:grpSpPr>
+      <p:grpSp>
+        <p:nvGrpSpPr>
+          <p:cNvPr id="39" name="Group 38">
+            <a:extLst>
+              <a:ext uri="{FF2B5EF4-FFF2-40B4-BE49-F238E27FC236}">
+                <a16:creationId xmlns:a16="http://schemas.microsoft.com/office/drawing/2014/main" id="{21F932F8-697B-1692-AC81-0E156A508A02}"/>
+              </a:ext>
+            </a:extLst>
+          </p:cNvPr>
+          <p:cNvGrpSpPr/>
+          <p:nvPr/>
+        </p:nvGrpSpPr>
+        <p:grpSpPr>
+          <a:xfrm>
+            <a:off x="647701" y="459581"/>
+            <a:ext cx="3236682" cy="5938838"/>
+            <a:chOff x="6096000" y="328612"/>
+            <a:chExt cx="4581525" cy="8406429"/>
+          </a:xfrm>
+        </p:grpSpPr>
+        <p:pic>
+          <p:nvPicPr>
+            <p:cNvPr id="7" name="Picture 6">
+              <a:extLst>
+                <a:ext uri="{FF2B5EF4-FFF2-40B4-BE49-F238E27FC236}">
+                  <a16:creationId xmlns:a16="http://schemas.microsoft.com/office/drawing/2014/main" id="{1B76A090-50CC-39CF-1BD9-06DAE1E8288E}"/>
+                </a:ext>
+              </a:extLst>
+            </p:cNvPr>
+            <p:cNvPicPr>
+              <a:picLocks noChangeAspect="1"/>
+            </p:cNvPicPr>
+            <p:nvPr/>
+          </p:nvPicPr>
+          <p:blipFill>
+            <a:blip r:embed="rId2"/>
+            <a:stretch>
+              <a:fillRect/>
+            </a:stretch>
+          </p:blipFill>
+          <p:spPr>
+            <a:xfrm>
+              <a:off x="6096000" y="328612"/>
+              <a:ext cx="4581525" cy="6200775"/>
+            </a:xfrm>
+            <a:prstGeom prst="rect">
+              <a:avLst/>
+            </a:prstGeom>
+          </p:spPr>
+        </p:pic>
+        <p:sp>
+          <p:nvSpPr>
+            <p:cNvPr id="8" name="Rectangle 7">
+              <a:extLst>
+                <a:ext uri="{FF2B5EF4-FFF2-40B4-BE49-F238E27FC236}">
+                  <a16:creationId xmlns:a16="http://schemas.microsoft.com/office/drawing/2014/main" id="{260BE231-07DC-DFCD-1FBD-D87A23668A53}"/>
+                </a:ext>
+              </a:extLst>
+            </p:cNvPr>
+            <p:cNvSpPr/>
+            <p:nvPr/>
+          </p:nvSpPr>
+          <p:spPr>
+            <a:xfrm>
+              <a:off x="7359588" y="4572000"/>
+              <a:ext cx="2166152" cy="1236213"/>
+            </a:xfrm>
+            <a:prstGeom prst="rect">
+              <a:avLst/>
+            </a:prstGeom>
+            <a:noFill/>
+            <a:ln w="57150">
+              <a:solidFill>
+                <a:schemeClr val="tx1"/>
+              </a:solidFill>
+            </a:ln>
+          </p:spPr>
+          <p:style>
+            <a:lnRef idx="2">
+              <a:schemeClr val="dk1">
+                <a:shade val="50000"/>
+              </a:schemeClr>
+            </a:lnRef>
+            <a:fillRef idx="1">
+              <a:schemeClr val="dk1"/>
+            </a:fillRef>
+            <a:effectRef idx="0">
+              <a:schemeClr val="dk1"/>
+            </a:effectRef>
+            <a:fontRef idx="minor">
+              <a:schemeClr val="lt1"/>
+            </a:fontRef>
+          </p:style>
+          <p:txBody>
+            <a:bodyPr rtlCol="0" anchor="ctr"/>
+            <a:lstStyle/>
+            <a:p>
+              <a:pPr algn="ctr"/>
+              <a:endParaRPr lang="en-US"/>
+            </a:p>
+          </p:txBody>
+        </p:sp>
+        <p:cxnSp>
+          <p:nvCxnSpPr>
+            <p:cNvPr id="10" name="Straight Connector 9">
+              <a:extLst>
+                <a:ext uri="{FF2B5EF4-FFF2-40B4-BE49-F238E27FC236}">
+                  <a16:creationId xmlns:a16="http://schemas.microsoft.com/office/drawing/2014/main" id="{FA045B14-A6A8-2533-CA91-6704C0C75FA9}"/>
+                </a:ext>
+              </a:extLst>
+            </p:cNvPr>
+            <p:cNvCxnSpPr>
+              <a:cxnSpLocks/>
+            </p:cNvCxnSpPr>
+            <p:nvPr/>
+          </p:nvCxnSpPr>
+          <p:spPr>
+            <a:xfrm>
+              <a:off x="7865616" y="5033639"/>
+              <a:ext cx="976543" cy="0"/>
+            </a:xfrm>
+            <a:prstGeom prst="line">
+              <a:avLst/>
+            </a:prstGeom>
+            <a:ln w="57150"/>
+          </p:spPr>
+          <p:style>
+            <a:lnRef idx="1">
+              <a:schemeClr val="dk1"/>
+            </a:lnRef>
+            <a:fillRef idx="0">
+              <a:schemeClr val="dk1"/>
+            </a:fillRef>
+            <a:effectRef idx="0">
+              <a:schemeClr val="dk1"/>
+            </a:effectRef>
+            <a:fontRef idx="minor">
+              <a:schemeClr val="tx1"/>
+            </a:fontRef>
+          </p:style>
+        </p:cxnSp>
+        <p:cxnSp>
+          <p:nvCxnSpPr>
+            <p:cNvPr id="18" name="Straight Connector 17">
+              <a:extLst>
+                <a:ext uri="{FF2B5EF4-FFF2-40B4-BE49-F238E27FC236}">
+                  <a16:creationId xmlns:a16="http://schemas.microsoft.com/office/drawing/2014/main" id="{3838E3CB-3217-DA4D-07CD-A3B0945B9858}"/>
+                </a:ext>
+              </a:extLst>
+            </p:cNvPr>
+            <p:cNvCxnSpPr>
+              <a:cxnSpLocks/>
+            </p:cNvCxnSpPr>
+            <p:nvPr/>
+          </p:nvCxnSpPr>
+          <p:spPr>
+            <a:xfrm>
+              <a:off x="7865614" y="5033639"/>
+              <a:ext cx="976544" cy="395056"/>
+            </a:xfrm>
+            <a:prstGeom prst="line">
+              <a:avLst/>
+            </a:prstGeom>
+            <a:ln w="57150"/>
+          </p:spPr>
+          <p:style>
+            <a:lnRef idx="1">
+              <a:schemeClr val="dk1"/>
+            </a:lnRef>
+            <a:fillRef idx="0">
+              <a:schemeClr val="dk1"/>
+            </a:fillRef>
+            <a:effectRef idx="0">
+              <a:schemeClr val="dk1"/>
+            </a:effectRef>
+            <a:fontRef idx="minor">
+              <a:schemeClr val="tx1"/>
+            </a:fontRef>
+          </p:style>
+        </p:cxnSp>
+        <p:cxnSp>
+          <p:nvCxnSpPr>
+            <p:cNvPr id="20" name="Straight Connector 19">
+              <a:extLst>
+                <a:ext uri="{FF2B5EF4-FFF2-40B4-BE49-F238E27FC236}">
+                  <a16:creationId xmlns:a16="http://schemas.microsoft.com/office/drawing/2014/main" id="{12DEF7C9-4BEF-90B7-3AE6-799F8AD3762B}"/>
+                </a:ext>
+              </a:extLst>
+            </p:cNvPr>
+            <p:cNvCxnSpPr>
+              <a:cxnSpLocks/>
+            </p:cNvCxnSpPr>
+            <p:nvPr/>
+          </p:nvCxnSpPr>
+          <p:spPr>
+            <a:xfrm flipV="1">
+              <a:off x="8025414" y="5428695"/>
+              <a:ext cx="816744" cy="121998"/>
+            </a:xfrm>
+            <a:prstGeom prst="line">
+              <a:avLst/>
+            </a:prstGeom>
+            <a:ln w="57150"/>
+          </p:spPr>
+          <p:style>
+            <a:lnRef idx="1">
+              <a:schemeClr val="dk1"/>
+            </a:lnRef>
+            <a:fillRef idx="0">
+              <a:schemeClr val="dk1"/>
+            </a:fillRef>
+            <a:effectRef idx="0">
+              <a:schemeClr val="dk1"/>
+            </a:effectRef>
+            <a:fontRef idx="minor">
+              <a:schemeClr val="tx1"/>
+            </a:fontRef>
+          </p:style>
+        </p:cxnSp>
+        <p:cxnSp>
+          <p:nvCxnSpPr>
+            <p:cNvPr id="23" name="Straight Connector 22">
+              <a:extLst>
+                <a:ext uri="{FF2B5EF4-FFF2-40B4-BE49-F238E27FC236}">
+                  <a16:creationId xmlns:a16="http://schemas.microsoft.com/office/drawing/2014/main" id="{B9267C24-10BB-0888-34BA-F71A8311DA7F}"/>
+                </a:ext>
+              </a:extLst>
+            </p:cNvPr>
+            <p:cNvCxnSpPr>
+              <a:cxnSpLocks/>
+            </p:cNvCxnSpPr>
+            <p:nvPr/>
+          </p:nvCxnSpPr>
+          <p:spPr>
+            <a:xfrm flipV="1">
+              <a:off x="8025414" y="5028265"/>
+              <a:ext cx="769720" cy="522428"/>
+            </a:xfrm>
+            <a:prstGeom prst="line">
+              <a:avLst/>
+            </a:prstGeom>
+            <a:ln w="57150"/>
+          </p:spPr>
+          <p:style>
+            <a:lnRef idx="1">
+              <a:schemeClr val="dk1"/>
+            </a:lnRef>
+            <a:fillRef idx="0">
+              <a:schemeClr val="dk1"/>
+            </a:fillRef>
+            <a:effectRef idx="0">
+              <a:schemeClr val="dk1"/>
+            </a:effectRef>
+            <a:fontRef idx="minor">
+              <a:schemeClr val="tx1"/>
+            </a:fontRef>
+          </p:style>
+        </p:cxnSp>
+        <p:sp>
+          <p:nvSpPr>
+            <p:cNvPr id="30" name="Rectangle: Rounded Corners 29">
+              <a:extLst>
+                <a:ext uri="{FF2B5EF4-FFF2-40B4-BE49-F238E27FC236}">
+                  <a16:creationId xmlns:a16="http://schemas.microsoft.com/office/drawing/2014/main" id="{0564BEE8-99F1-A5D5-461C-799FBB82E912}"/>
+                </a:ext>
+              </a:extLst>
+            </p:cNvPr>
+            <p:cNvSpPr/>
+            <p:nvPr/>
+          </p:nvSpPr>
+          <p:spPr>
+            <a:xfrm rot="1065709">
+              <a:off x="7767185" y="5206750"/>
+              <a:ext cx="478126" cy="3528291"/>
+            </a:xfrm>
+            <a:prstGeom prst="roundRect">
+              <a:avLst>
+                <a:gd name="adj" fmla="val 43712"/>
+              </a:avLst>
+            </a:prstGeom>
+            <a:solidFill>
+              <a:schemeClr val="accent6">
+                <a:lumMod val="60000"/>
+                <a:lumOff val="40000"/>
+                <a:alpha val="52000"/>
+              </a:schemeClr>
+            </a:solidFill>
+            <a:ln>
+              <a:solidFill>
+                <a:schemeClr val="tx1"/>
+              </a:solidFill>
+            </a:ln>
+          </p:spPr>
+          <p:style>
+            <a:lnRef idx="2">
+              <a:schemeClr val="accent1">
+                <a:shade val="50000"/>
+              </a:schemeClr>
+            </a:lnRef>
+            <a:fillRef idx="1">
+              <a:schemeClr val="accent1"/>
+            </a:fillRef>
+            <a:effectRef idx="0">
+              <a:schemeClr val="accent1"/>
+            </a:effectRef>
+            <a:fontRef idx="minor">
+              <a:schemeClr val="lt1"/>
+            </a:fontRef>
+          </p:style>
+          <p:txBody>
+            <a:bodyPr rtlCol="0" anchor="ctr"/>
+            <a:lstStyle/>
+            <a:p>
+              <a:pPr algn="ctr"/>
+              <a:endParaRPr lang="en-US" dirty="0"/>
+            </a:p>
+          </p:txBody>
+        </p:sp>
+        <p:sp>
+          <p:nvSpPr>
+            <p:cNvPr id="31" name="Oval 30">
+              <a:extLst>
+                <a:ext uri="{FF2B5EF4-FFF2-40B4-BE49-F238E27FC236}">
+                  <a16:creationId xmlns:a16="http://schemas.microsoft.com/office/drawing/2014/main" id="{1AC6C5CD-586D-2923-A071-F44C3C40548B}"/>
+                </a:ext>
+              </a:extLst>
+            </p:cNvPr>
+            <p:cNvSpPr/>
+            <p:nvPr/>
+          </p:nvSpPr>
+          <p:spPr>
+            <a:xfrm>
+              <a:off x="8359047" y="5434070"/>
+              <a:ext cx="184727" cy="184727"/>
+            </a:xfrm>
+            <a:prstGeom prst="ellipse">
+              <a:avLst/>
+            </a:prstGeom>
+            <a:solidFill>
+              <a:srgbClr val="C00000"/>
+            </a:solidFill>
+            <a:ln>
+              <a:solidFill>
+                <a:schemeClr val="tx1"/>
+              </a:solidFill>
+            </a:ln>
+          </p:spPr>
+          <p:style>
+            <a:lnRef idx="2">
+              <a:schemeClr val="accent1">
+                <a:shade val="50000"/>
+              </a:schemeClr>
+            </a:lnRef>
+            <a:fillRef idx="1">
+              <a:schemeClr val="accent1"/>
+            </a:fillRef>
+            <a:effectRef idx="0">
+              <a:schemeClr val="accent1"/>
+            </a:effectRef>
+            <a:fontRef idx="minor">
+              <a:schemeClr val="lt1"/>
+            </a:fontRef>
+          </p:style>
+          <p:txBody>
+            <a:bodyPr rtlCol="0" anchor="ctr"/>
+            <a:lstStyle/>
+            <a:p>
+              <a:pPr algn="ctr"/>
+              <a:endParaRPr lang="en-US"/>
+            </a:p>
+          </p:txBody>
+        </p:sp>
+        <p:sp>
+          <p:nvSpPr>
+            <p:cNvPr id="32" name="Rectangle: Diagonal Corners Snipped 31">
+              <a:extLst>
+                <a:ext uri="{FF2B5EF4-FFF2-40B4-BE49-F238E27FC236}">
+                  <a16:creationId xmlns:a16="http://schemas.microsoft.com/office/drawing/2014/main" id="{8FEEF439-4E32-AFDE-2D78-BA52B63AAFDF}"/>
+                </a:ext>
+              </a:extLst>
+            </p:cNvPr>
+            <p:cNvSpPr/>
+            <p:nvPr/>
+          </p:nvSpPr>
+          <p:spPr>
+            <a:xfrm>
+              <a:off x="7451915" y="4556672"/>
+              <a:ext cx="868219" cy="868219"/>
+            </a:xfrm>
+            <a:prstGeom prst="snip2DiagRect">
+              <a:avLst>
+                <a:gd name="adj1" fmla="val 0"/>
+                <a:gd name="adj2" fmla="val 50000"/>
+              </a:avLst>
+            </a:prstGeom>
+            <a:solidFill>
+              <a:schemeClr val="accent2">
+                <a:lumMod val="40000"/>
+                <a:lumOff val="60000"/>
+                <a:alpha val="58000"/>
+              </a:schemeClr>
+            </a:solidFill>
+            <a:ln>
+              <a:solidFill>
+                <a:schemeClr val="tx1"/>
+              </a:solidFill>
+            </a:ln>
+          </p:spPr>
+          <p:style>
+            <a:lnRef idx="2">
+              <a:schemeClr val="accent2">
+                <a:shade val="50000"/>
+              </a:schemeClr>
+            </a:lnRef>
+            <a:fillRef idx="1">
+              <a:schemeClr val="accent2"/>
+            </a:fillRef>
+            <a:effectRef idx="0">
+              <a:schemeClr val="accent2"/>
+            </a:effectRef>
+            <a:fontRef idx="minor">
+              <a:schemeClr val="lt1"/>
+            </a:fontRef>
+          </p:style>
+          <p:txBody>
+            <a:bodyPr rtlCol="0" anchor="ctr"/>
+            <a:lstStyle/>
+            <a:p>
+              <a:pPr algn="ctr"/>
+              <a:endParaRPr lang="en-US"/>
+            </a:p>
+          </p:txBody>
+        </p:sp>
+        <p:sp>
+          <p:nvSpPr>
+            <p:cNvPr id="33" name="Oval 32">
+              <a:extLst>
+                <a:ext uri="{FF2B5EF4-FFF2-40B4-BE49-F238E27FC236}">
+                  <a16:creationId xmlns:a16="http://schemas.microsoft.com/office/drawing/2014/main" id="{5C5AC8EB-536A-6DD9-E76B-CDD3452D9415}"/>
+                </a:ext>
+              </a:extLst>
+            </p:cNvPr>
+            <p:cNvSpPr/>
+            <p:nvPr/>
+          </p:nvSpPr>
+          <p:spPr>
+            <a:xfrm>
+              <a:off x="7793662" y="4935900"/>
+              <a:ext cx="184727" cy="184727"/>
+            </a:xfrm>
+            <a:prstGeom prst="ellipse">
+              <a:avLst/>
+            </a:prstGeom>
+            <a:solidFill>
+              <a:srgbClr val="C00000"/>
+            </a:solidFill>
+            <a:ln>
+              <a:solidFill>
+                <a:schemeClr val="tx1"/>
+              </a:solidFill>
+            </a:ln>
+          </p:spPr>
+          <p:style>
+            <a:lnRef idx="2">
+              <a:schemeClr val="accent1">
+                <a:shade val="50000"/>
+              </a:schemeClr>
+            </a:lnRef>
+            <a:fillRef idx="1">
+              <a:schemeClr val="accent1"/>
+            </a:fillRef>
+            <a:effectRef idx="0">
+              <a:schemeClr val="accent1"/>
+            </a:effectRef>
+            <a:fontRef idx="minor">
+              <a:schemeClr val="lt1"/>
+            </a:fontRef>
+          </p:style>
+          <p:txBody>
+            <a:bodyPr rtlCol="0" anchor="ctr"/>
+            <a:lstStyle/>
+            <a:p>
+              <a:pPr algn="ctr"/>
+              <a:endParaRPr lang="en-US"/>
+            </a:p>
+          </p:txBody>
+        </p:sp>
+        <p:sp>
+          <p:nvSpPr>
+            <p:cNvPr id="34" name="Oval 33">
+              <a:extLst>
+                <a:ext uri="{FF2B5EF4-FFF2-40B4-BE49-F238E27FC236}">
+                  <a16:creationId xmlns:a16="http://schemas.microsoft.com/office/drawing/2014/main" id="{0E4EC3D1-ED21-FB15-F7C9-E14EBF5C10BE}"/>
+                </a:ext>
+              </a:extLst>
+            </p:cNvPr>
+            <p:cNvSpPr/>
+            <p:nvPr/>
+          </p:nvSpPr>
+          <p:spPr>
+            <a:xfrm>
+              <a:off x="8256106" y="3495027"/>
+              <a:ext cx="184727" cy="184727"/>
+            </a:xfrm>
+            <a:prstGeom prst="ellipse">
+              <a:avLst/>
+            </a:prstGeom>
+            <a:solidFill>
+              <a:srgbClr val="C00000"/>
+            </a:solidFill>
+            <a:ln>
+              <a:solidFill>
+                <a:schemeClr val="tx1"/>
+              </a:solidFill>
+            </a:ln>
+          </p:spPr>
+          <p:style>
+            <a:lnRef idx="2">
+              <a:schemeClr val="accent1">
+                <a:shade val="50000"/>
+              </a:schemeClr>
+            </a:lnRef>
+            <a:fillRef idx="1">
+              <a:schemeClr val="accent1"/>
+            </a:fillRef>
+            <a:effectRef idx="0">
+              <a:schemeClr val="accent1"/>
+            </a:effectRef>
+            <a:fontRef idx="minor">
+              <a:schemeClr val="lt1"/>
+            </a:fontRef>
+          </p:style>
+          <p:txBody>
+            <a:bodyPr rtlCol="0" anchor="ctr"/>
+            <a:lstStyle/>
+            <a:p>
+              <a:pPr algn="ctr"/>
+              <a:endParaRPr lang="en-US"/>
+            </a:p>
+          </p:txBody>
+        </p:sp>
+      </p:grpSp>
+    </p:spTree>
+    <p:extLst>
+      <p:ext uri="{BB962C8B-B14F-4D97-AF65-F5344CB8AC3E}">
+        <p14:creationId xmlns:p14="http://schemas.microsoft.com/office/powerpoint/2010/main" val="3763349203"/>
+      </p:ext>
+    </p:extLst>
+  </p:cSld>
+  <p:clrMapOvr>
+    <a:masterClrMapping/>
+  </p:clrMapOvr>
+</p:sld>
+</file>
+
 <file path=ppt/theme/theme1.xml><?xml version="1.0" encoding="utf-8"?>
 <a:theme xmlns:a="http://schemas.openxmlformats.org/drawingml/2006/main" name="Office Theme">
   <a:themeElements>

</xml_diff>